<commit_message>
feat: task 2 detail diagrams
</commit_message>
<xml_diff>
--- a/product-pitch.pptx
+++ b/product-pitch.pptx
@@ -14,6 +14,7 @@
     <p:sldId id="262" r:id="rId8"/>
     <p:sldId id="263" r:id="rId9"/>
     <p:sldId id="264" r:id="rId10"/>
+    <p:sldId id="265" r:id="rId11"/>
   </p:sldIdLst>
   <p:sldSz cx="12192000" cy="6858000"/>
   <p:notesSz cx="6858000" cy="9144000"/>
@@ -112,6 +113,11 @@
       </a:defRPr>
     </a:lvl9pPr>
   </p:defaultTextStyle>
+  <p:extLst>
+    <p:ext uri="{EFAFB233-063F-42B5-8137-9DF3F51BA10A}">
+      <p15:sldGuideLst xmlns:p15="http://schemas.microsoft.com/office/powerpoint/2012/main"/>
+    </p:ext>
+  </p:extLst>
 </p:presentation>
 </file>
 
@@ -262,7 +268,7 @@
           <a:p>
             <a:fld id="{B58073E2-C3A5-6D48-B9FE-42C8D94DDAC6}" type="datetimeFigureOut">
               <a:rPr lang="en-US" smtClean="0"/>
-              <a:t>9/8/24</a:t>
+              <a:t>9/9/24</a:t>
             </a:fld>
             <a:endParaRPr lang="en-US"/>
           </a:p>
@@ -460,7 +466,7 @@
           <a:p>
             <a:fld id="{B58073E2-C3A5-6D48-B9FE-42C8D94DDAC6}" type="datetimeFigureOut">
               <a:rPr lang="en-US" smtClean="0"/>
-              <a:t>9/8/24</a:t>
+              <a:t>9/9/24</a:t>
             </a:fld>
             <a:endParaRPr lang="en-US"/>
           </a:p>
@@ -668,7 +674,7 @@
           <a:p>
             <a:fld id="{B58073E2-C3A5-6D48-B9FE-42C8D94DDAC6}" type="datetimeFigureOut">
               <a:rPr lang="en-US" smtClean="0"/>
-              <a:t>9/8/24</a:t>
+              <a:t>9/9/24</a:t>
             </a:fld>
             <a:endParaRPr lang="en-US"/>
           </a:p>
@@ -866,7 +872,7 @@
           <a:p>
             <a:fld id="{B58073E2-C3A5-6D48-B9FE-42C8D94DDAC6}" type="datetimeFigureOut">
               <a:rPr lang="en-US" smtClean="0"/>
-              <a:t>9/8/24</a:t>
+              <a:t>9/9/24</a:t>
             </a:fld>
             <a:endParaRPr lang="en-US"/>
           </a:p>
@@ -1141,7 +1147,7 @@
           <a:p>
             <a:fld id="{B58073E2-C3A5-6D48-B9FE-42C8D94DDAC6}" type="datetimeFigureOut">
               <a:rPr lang="en-US" smtClean="0"/>
-              <a:t>9/8/24</a:t>
+              <a:t>9/9/24</a:t>
             </a:fld>
             <a:endParaRPr lang="en-US"/>
           </a:p>
@@ -1406,7 +1412,7 @@
           <a:p>
             <a:fld id="{B58073E2-C3A5-6D48-B9FE-42C8D94DDAC6}" type="datetimeFigureOut">
               <a:rPr lang="en-US" smtClean="0"/>
-              <a:t>9/8/24</a:t>
+              <a:t>9/9/24</a:t>
             </a:fld>
             <a:endParaRPr lang="en-US"/>
           </a:p>
@@ -1818,7 +1824,7 @@
           <a:p>
             <a:fld id="{B58073E2-C3A5-6D48-B9FE-42C8D94DDAC6}" type="datetimeFigureOut">
               <a:rPr lang="en-US" smtClean="0"/>
-              <a:t>9/8/24</a:t>
+              <a:t>9/9/24</a:t>
             </a:fld>
             <a:endParaRPr lang="en-US"/>
           </a:p>
@@ -1959,7 +1965,7 @@
           <a:p>
             <a:fld id="{B58073E2-C3A5-6D48-B9FE-42C8D94DDAC6}" type="datetimeFigureOut">
               <a:rPr lang="en-US" smtClean="0"/>
-              <a:t>9/8/24</a:t>
+              <a:t>9/9/24</a:t>
             </a:fld>
             <a:endParaRPr lang="en-US"/>
           </a:p>
@@ -2072,7 +2078,7 @@
           <a:p>
             <a:fld id="{B58073E2-C3A5-6D48-B9FE-42C8D94DDAC6}" type="datetimeFigureOut">
               <a:rPr lang="en-US" smtClean="0"/>
-              <a:t>9/8/24</a:t>
+              <a:t>9/9/24</a:t>
             </a:fld>
             <a:endParaRPr lang="en-US"/>
           </a:p>
@@ -2383,7 +2389,7 @@
           <a:p>
             <a:fld id="{B58073E2-C3A5-6D48-B9FE-42C8D94DDAC6}" type="datetimeFigureOut">
               <a:rPr lang="en-US" smtClean="0"/>
-              <a:t>9/8/24</a:t>
+              <a:t>9/9/24</a:t>
             </a:fld>
             <a:endParaRPr lang="en-US"/>
           </a:p>
@@ -2671,7 +2677,7 @@
           <a:p>
             <a:fld id="{B58073E2-C3A5-6D48-B9FE-42C8D94DDAC6}" type="datetimeFigureOut">
               <a:rPr lang="en-US" smtClean="0"/>
-              <a:t>9/8/24</a:t>
+              <a:t>9/9/24</a:t>
             </a:fld>
             <a:endParaRPr lang="en-US"/>
           </a:p>
@@ -2912,7 +2918,7 @@
           <a:p>
             <a:fld id="{B58073E2-C3A5-6D48-B9FE-42C8D94DDAC6}" type="datetimeFigureOut">
               <a:rPr lang="en-US" smtClean="0"/>
-              <a:t>9/8/24</a:t>
+              <a:t>9/9/24</a:t>
             </a:fld>
             <a:endParaRPr lang="en-US"/>
           </a:p>
@@ -3577,6 +3583,233 @@
 </p:sld>
 </file>
 
+<file path=ppt/slides/slide10.xml><?xml version="1.0" encoding="utf-8"?>
+<p:sld xmlns:a="http://schemas.openxmlformats.org/drawingml/2006/main" xmlns:r="http://schemas.openxmlformats.org/officeDocument/2006/relationships" xmlns:p="http://schemas.openxmlformats.org/presentationml/2006/main">
+  <p:cSld>
+    <p:spTree>
+      <p:nvGrpSpPr>
+        <p:cNvPr id="1" name=""/>
+        <p:cNvGrpSpPr/>
+        <p:nvPr/>
+      </p:nvGrpSpPr>
+      <p:grpSpPr>
+        <a:xfrm>
+          <a:off x="0" y="0"/>
+          <a:ext cx="0" cy="0"/>
+          <a:chOff x="0" y="0"/>
+          <a:chExt cx="0" cy="0"/>
+        </a:xfrm>
+      </p:grpSpPr>
+      <p:sp>
+        <p:nvSpPr>
+          <p:cNvPr id="2" name="Title 1">
+            <a:extLst>
+              <a:ext uri="{FF2B5EF4-FFF2-40B4-BE49-F238E27FC236}">
+                <a16:creationId xmlns:a16="http://schemas.microsoft.com/office/drawing/2014/main" id="{B0E9E5CB-087F-118C-B9DC-A3A400D77D46}"/>
+              </a:ext>
+            </a:extLst>
+          </p:cNvPr>
+          <p:cNvSpPr>
+            <a:spLocks noGrp="1"/>
+          </p:cNvSpPr>
+          <p:nvPr>
+            <p:ph type="title"/>
+          </p:nvPr>
+        </p:nvSpPr>
+        <p:spPr>
+          <a:xfrm>
+            <a:off x="1179226" y="1280679"/>
+            <a:ext cx="9833548" cy="1325563"/>
+          </a:xfrm>
+        </p:spPr>
+        <p:txBody>
+          <a:bodyPr anchor="b">
+            <a:normAutofit/>
+          </a:bodyPr>
+          <a:lstStyle/>
+          <a:p>
+            <a:pPr algn="ctr"/>
+            <a:r>
+              <a:rPr lang="en-US" sz="3600" dirty="0">
+                <a:solidFill>
+                  <a:schemeClr val="tx2"/>
+                </a:solidFill>
+              </a:rPr>
+              <a:t>Closing notes</a:t>
+            </a:r>
+          </a:p>
+        </p:txBody>
+      </p:sp>
+      <p:sp>
+        <p:nvSpPr>
+          <p:cNvPr id="3" name="Content Placeholder 2">
+            <a:extLst>
+              <a:ext uri="{FF2B5EF4-FFF2-40B4-BE49-F238E27FC236}">
+                <a16:creationId xmlns:a16="http://schemas.microsoft.com/office/drawing/2014/main" id="{F9DD4AE4-E927-42B1-200E-DD9AB9AF2EFE}"/>
+              </a:ext>
+            </a:extLst>
+          </p:cNvPr>
+          <p:cNvSpPr>
+            <a:spLocks noGrp="1"/>
+          </p:cNvSpPr>
+          <p:nvPr>
+            <p:ph idx="1"/>
+          </p:nvPr>
+        </p:nvSpPr>
+        <p:spPr>
+          <a:xfrm>
+            <a:off x="1179226" y="2890979"/>
+            <a:ext cx="9833548" cy="2693976"/>
+          </a:xfrm>
+        </p:spPr>
+        <p:txBody>
+          <a:bodyPr>
+            <a:normAutofit/>
+          </a:bodyPr>
+          <a:lstStyle/>
+          <a:p>
+            <a:r>
+              <a:rPr lang="en-US" sz="1800" dirty="0">
+                <a:solidFill>
+                  <a:schemeClr val="tx2"/>
+                </a:solidFill>
+              </a:rPr>
+              <a:t>GitHub Repo: </a:t>
+            </a:r>
+            <a:r>
+              <a:rPr lang="en-US" sz="1800" dirty="0">
+                <a:solidFill>
+                  <a:schemeClr val="tx2"/>
+                </a:solidFill>
+                <a:hlinkClick r:id="rId2"/>
+              </a:rPr>
+              <a:t>https://github.com/desourav/on-man</a:t>
+            </a:r>
+            <a:endParaRPr lang="en-US" sz="1800" dirty="0">
+              <a:solidFill>
+                <a:schemeClr val="tx2"/>
+              </a:solidFill>
+            </a:endParaRPr>
+          </a:p>
+          <a:p>
+            <a:r>
+              <a:rPr lang="en-US" sz="1800" dirty="0">
+                <a:solidFill>
+                  <a:schemeClr val="tx2"/>
+                </a:solidFill>
+              </a:rPr>
+              <a:t>Docker hub Repo: </a:t>
+            </a:r>
+            <a:r>
+              <a:rPr lang="en-US" sz="1800" dirty="0">
+                <a:solidFill>
+                  <a:schemeClr val="tx2"/>
+                </a:solidFill>
+                <a:hlinkClick r:id="rId3"/>
+              </a:rPr>
+              <a:t>https://hub.docker.com/r/desourav0607/on-man</a:t>
+            </a:r>
+            <a:endParaRPr lang="en-US" sz="1800" dirty="0">
+              <a:solidFill>
+                <a:schemeClr val="tx2"/>
+              </a:solidFill>
+            </a:endParaRPr>
+          </a:p>
+          <a:p>
+            <a:r>
+              <a:rPr lang="en-US" sz="1800" dirty="0">
+                <a:solidFill>
+                  <a:schemeClr val="tx2"/>
+                </a:solidFill>
+              </a:rPr>
+              <a:t>Questions: </a:t>
+            </a:r>
+            <a:r>
+              <a:rPr lang="en-US" sz="1800" dirty="0">
+                <a:solidFill>
+                  <a:schemeClr val="tx2"/>
+                </a:solidFill>
+                <a:hlinkClick r:id="rId4"/>
+              </a:rPr>
+              <a:t>desour@gmail.com</a:t>
+            </a:r>
+            <a:endParaRPr lang="en-US" sz="1800" dirty="0">
+              <a:solidFill>
+                <a:schemeClr val="tx2"/>
+              </a:solidFill>
+            </a:endParaRPr>
+          </a:p>
+          <a:p>
+            <a:endParaRPr lang="en-US" sz="1800" dirty="0">
+              <a:solidFill>
+                <a:schemeClr val="tx2"/>
+              </a:solidFill>
+            </a:endParaRPr>
+          </a:p>
+          <a:p>
+            <a:endParaRPr lang="en-US" sz="1800" dirty="0">
+              <a:solidFill>
+                <a:schemeClr val="tx2"/>
+              </a:solidFill>
+            </a:endParaRPr>
+          </a:p>
+          <a:p>
+            <a:endParaRPr lang="en-US" sz="1800" dirty="0">
+              <a:solidFill>
+                <a:schemeClr val="tx2"/>
+              </a:solidFill>
+            </a:endParaRPr>
+          </a:p>
+        </p:txBody>
+      </p:sp>
+      <p:sp>
+        <p:nvSpPr>
+          <p:cNvPr id="4" name="TextBox 3">
+            <a:extLst>
+              <a:ext uri="{FF2B5EF4-FFF2-40B4-BE49-F238E27FC236}">
+                <a16:creationId xmlns:a16="http://schemas.microsoft.com/office/drawing/2014/main" id="{F4B2065B-9A80-4517-E76B-C6BBCBBFC4DA}"/>
+              </a:ext>
+            </a:extLst>
+          </p:cNvPr>
+          <p:cNvSpPr txBox="1"/>
+          <p:nvPr/>
+        </p:nvSpPr>
+        <p:spPr>
+          <a:xfrm>
+            <a:off x="5159828" y="5207989"/>
+            <a:ext cx="2226443" cy="369332"/>
+          </a:xfrm>
+          <a:prstGeom prst="rect">
+            <a:avLst/>
+          </a:prstGeom>
+          <a:noFill/>
+        </p:spPr>
+        <p:txBody>
+          <a:bodyPr wrap="none" rtlCol="0">
+            <a:spAutoFit/>
+          </a:bodyPr>
+          <a:lstStyle/>
+          <a:p>
+            <a:r>
+              <a:rPr lang="en-US" dirty="0"/>
+              <a:t>Thanks for watching!</a:t>
+            </a:r>
+          </a:p>
+        </p:txBody>
+      </p:sp>
+    </p:spTree>
+    <p:extLst>
+      <p:ext uri="{BB962C8B-B14F-4D97-AF65-F5344CB8AC3E}">
+        <p14:creationId xmlns:p14="http://schemas.microsoft.com/office/powerpoint/2010/main" val="1814641517"/>
+      </p:ext>
+    </p:extLst>
+  </p:cSld>
+  <p:clrMapOvr>
+    <a:masterClrMapping/>
+  </p:clrMapOvr>
+</p:sld>
+</file>
+
 <file path=ppt/slides/slide2.xml><?xml version="1.0" encoding="utf-8"?>
 <p:sld xmlns:a="http://schemas.openxmlformats.org/drawingml/2006/main" xmlns:r="http://schemas.openxmlformats.org/officeDocument/2006/relationships" xmlns:p="http://schemas.openxmlformats.org/presentationml/2006/main">
   <p:cSld>
@@ -9117,7 +9350,7 @@
                   <a:schemeClr val="tx2"/>
                 </a:solidFill>
               </a:rPr>
-              <a:t>Fast API response that enables high performance read and write to the database</a:t>
+              <a:t>Fast API response that enables instant read and write to the database</a:t>
             </a:r>
           </a:p>
           <a:p>
@@ -10608,7 +10841,7 @@
                   <a:schemeClr val="tx2"/>
                 </a:solidFill>
               </a:rPr>
-              <a:t>What are the key benefits on-man?</a:t>
+              <a:t>What are the key benefits of on-man?</a:t>
             </a:r>
           </a:p>
         </p:txBody>
@@ -22756,6 +22989,16 @@
                   <a:schemeClr val="tx2"/>
                 </a:solidFill>
               </a:rPr>
+              <a:t>On-Man performs lightweight validation upfront to avoid user error on create/update concepts actions.</a:t>
+            </a:r>
+          </a:p>
+          <a:p>
+            <a:r>
+              <a:rPr lang="en-US" sz="1800" dirty="0">
+                <a:solidFill>
+                  <a:schemeClr val="tx2"/>
+                </a:solidFill>
+              </a:rPr>
               <a:t>On-Man ensures the data is aligned in the backend database using On-Align (accompanying application that runs as Cronjob)</a:t>
             </a:r>
           </a:p>
@@ -22770,16 +23013,9 @@
             </a:r>
           </a:p>
           <a:p>
-            <a:r>
-              <a:rPr lang="en-US" sz="1800" dirty="0">
-                <a:solidFill>
-                  <a:schemeClr val="tx2"/>
-                </a:solidFill>
-              </a:rPr>
-              <a:t>On-Man performs lightweight validation upfront to avoid user error on create/update concepts actions.</a:t>
-            </a:r>
-          </a:p>
-          <a:p>
+            <a:pPr marL="0" indent="0">
+              <a:buNone/>
+            </a:pPr>
             <a:endParaRPr lang="en-US" sz="1800" dirty="0">
               <a:solidFill>
                 <a:schemeClr val="tx2"/>
@@ -26175,17 +26411,7 @@
                   <a:schemeClr val="tx2"/>
                 </a:solidFill>
               </a:rPr>
-              <a:t>Heavyweight validation and alignment are done in the backend using On-Align CronJob application</a:t>
-            </a:r>
-          </a:p>
-          <a:p>
-            <a:r>
-              <a:rPr lang="en-US" sz="1800" dirty="0">
-                <a:solidFill>
-                  <a:schemeClr val="tx2"/>
-                </a:solidFill>
-              </a:rPr>
-              <a:t>Every API call responds with useful status code and message</a:t>
+              <a:t>Heavyweight validation and alignment are done in the backend using On-Align Cronjob application</a:t>
             </a:r>
           </a:p>
           <a:p>

</xml_diff>

<commit_message>
feat: product pitch and task3
</commit_message>
<xml_diff>
--- a/product-pitch.pptx
+++ b/product-pitch.pptx
@@ -268,7 +268,7 @@
           <a:p>
             <a:fld id="{B58073E2-C3A5-6D48-B9FE-42C8D94DDAC6}" type="datetimeFigureOut">
               <a:rPr lang="en-US" smtClean="0"/>
-              <a:t>9/9/24</a:t>
+              <a:t>9/10/24</a:t>
             </a:fld>
             <a:endParaRPr lang="en-US"/>
           </a:p>
@@ -466,7 +466,7 @@
           <a:p>
             <a:fld id="{B58073E2-C3A5-6D48-B9FE-42C8D94DDAC6}" type="datetimeFigureOut">
               <a:rPr lang="en-US" smtClean="0"/>
-              <a:t>9/9/24</a:t>
+              <a:t>9/10/24</a:t>
             </a:fld>
             <a:endParaRPr lang="en-US"/>
           </a:p>
@@ -674,7 +674,7 @@
           <a:p>
             <a:fld id="{B58073E2-C3A5-6D48-B9FE-42C8D94DDAC6}" type="datetimeFigureOut">
               <a:rPr lang="en-US" smtClean="0"/>
-              <a:t>9/9/24</a:t>
+              <a:t>9/10/24</a:t>
             </a:fld>
             <a:endParaRPr lang="en-US"/>
           </a:p>
@@ -872,7 +872,7 @@
           <a:p>
             <a:fld id="{B58073E2-C3A5-6D48-B9FE-42C8D94DDAC6}" type="datetimeFigureOut">
               <a:rPr lang="en-US" smtClean="0"/>
-              <a:t>9/9/24</a:t>
+              <a:t>9/10/24</a:t>
             </a:fld>
             <a:endParaRPr lang="en-US"/>
           </a:p>
@@ -1147,7 +1147,7 @@
           <a:p>
             <a:fld id="{B58073E2-C3A5-6D48-B9FE-42C8D94DDAC6}" type="datetimeFigureOut">
               <a:rPr lang="en-US" smtClean="0"/>
-              <a:t>9/9/24</a:t>
+              <a:t>9/10/24</a:t>
             </a:fld>
             <a:endParaRPr lang="en-US"/>
           </a:p>
@@ -1412,7 +1412,7 @@
           <a:p>
             <a:fld id="{B58073E2-C3A5-6D48-B9FE-42C8D94DDAC6}" type="datetimeFigureOut">
               <a:rPr lang="en-US" smtClean="0"/>
-              <a:t>9/9/24</a:t>
+              <a:t>9/10/24</a:t>
             </a:fld>
             <a:endParaRPr lang="en-US"/>
           </a:p>
@@ -1824,7 +1824,7 @@
           <a:p>
             <a:fld id="{B58073E2-C3A5-6D48-B9FE-42C8D94DDAC6}" type="datetimeFigureOut">
               <a:rPr lang="en-US" smtClean="0"/>
-              <a:t>9/9/24</a:t>
+              <a:t>9/10/24</a:t>
             </a:fld>
             <a:endParaRPr lang="en-US"/>
           </a:p>
@@ -1965,7 +1965,7 @@
           <a:p>
             <a:fld id="{B58073E2-C3A5-6D48-B9FE-42C8D94DDAC6}" type="datetimeFigureOut">
               <a:rPr lang="en-US" smtClean="0"/>
-              <a:t>9/9/24</a:t>
+              <a:t>9/10/24</a:t>
             </a:fld>
             <a:endParaRPr lang="en-US"/>
           </a:p>
@@ -2078,7 +2078,7 @@
           <a:p>
             <a:fld id="{B58073E2-C3A5-6D48-B9FE-42C8D94DDAC6}" type="datetimeFigureOut">
               <a:rPr lang="en-US" smtClean="0"/>
-              <a:t>9/9/24</a:t>
+              <a:t>9/10/24</a:t>
             </a:fld>
             <a:endParaRPr lang="en-US"/>
           </a:p>
@@ -2389,7 +2389,7 @@
           <a:p>
             <a:fld id="{B58073E2-C3A5-6D48-B9FE-42C8D94DDAC6}" type="datetimeFigureOut">
               <a:rPr lang="en-US" smtClean="0"/>
-              <a:t>9/9/24</a:t>
+              <a:t>9/10/24</a:t>
             </a:fld>
             <a:endParaRPr lang="en-US"/>
           </a:p>
@@ -2677,7 +2677,7 @@
           <a:p>
             <a:fld id="{B58073E2-C3A5-6D48-B9FE-42C8D94DDAC6}" type="datetimeFigureOut">
               <a:rPr lang="en-US" smtClean="0"/>
-              <a:t>9/9/24</a:t>
+              <a:t>9/10/24</a:t>
             </a:fld>
             <a:endParaRPr lang="en-US"/>
           </a:p>
@@ -2918,7 +2918,7 @@
           <a:p>
             <a:fld id="{B58073E2-C3A5-6D48-B9FE-42C8D94DDAC6}" type="datetimeFigureOut">
               <a:rPr lang="en-US" smtClean="0"/>
-              <a:t>9/9/24</a:t>
+              <a:t>9/10/24</a:t>
             </a:fld>
             <a:endParaRPr lang="en-US"/>
           </a:p>

</xml_diff>